<commit_message>
Refactored naming of stores to sinks
</commit_message>
<xml_diff>
--- a/docs/images/Webhooks.pptx
+++ b/docs/images/Webhooks.pptx
@@ -2951,6 +2951,49 @@
       </p:grpSpPr>
       <p:sp>
         <p:nvSpPr>
+          <p:cNvPr id="19" name="Cylinder 18"/>
+          <p:cNvSpPr/>
+          <p:nvPr/>
+        </p:nvSpPr>
+        <p:spPr>
+          <a:xfrm>
+            <a:off x="4010158" y="5051350"/>
+            <a:ext cx="570449" cy="379570"/>
+          </a:xfrm>
+          <a:prstGeom prst="can">
+            <a:avLst/>
+          </a:prstGeom>
+        </p:spPr>
+        <p:style>
+          <a:lnRef idx="2">
+            <a:schemeClr val="accent1">
+              <a:shade val="50000"/>
+            </a:schemeClr>
+          </a:lnRef>
+          <a:fillRef idx="1">
+            <a:schemeClr val="accent1"/>
+          </a:fillRef>
+          <a:effectRef idx="0">
+            <a:schemeClr val="accent1"/>
+          </a:effectRef>
+          <a:fontRef idx="minor">
+            <a:schemeClr val="lt1"/>
+          </a:fontRef>
+        </p:style>
+        <p:txBody>
+          <a:bodyPr rtlCol="0" anchor="ctr"/>
+          <a:lstStyle/>
+          <a:p>
+            <a:pPr algn="ctr"/>
+            <a:r>
+              <a:rPr lang="en-US" sz="1200" dirty="0"/>
+              <a:t>Cache</a:t>
+            </a:r>
+          </a:p>
+        </p:txBody>
+      </p:sp>
+      <p:sp>
+        <p:nvSpPr>
           <p:cNvPr id="4" name="Rectangle 3"/>
           <p:cNvSpPr/>
           <p:nvPr/>

</xml_diff>